<commit_message>
Slight tweaks to progress presenstation
</commit_message>
<xml_diff>
--- a/SamuelNixon_InterimPresentation.pptx
+++ b/SamuelNixon_InterimPresentation.pptx
@@ -8,14 +8,16 @@
     <p:sldId id="256" r:id="rId2"/>
     <p:sldId id="266" r:id="rId3"/>
     <p:sldId id="257" r:id="rId4"/>
-    <p:sldId id="258" r:id="rId5"/>
-    <p:sldId id="261" r:id="rId6"/>
-    <p:sldId id="259" r:id="rId7"/>
-    <p:sldId id="260" r:id="rId8"/>
-    <p:sldId id="264" r:id="rId9"/>
-    <p:sldId id="262" r:id="rId10"/>
-    <p:sldId id="265" r:id="rId11"/>
-    <p:sldId id="263" r:id="rId12"/>
+    <p:sldId id="268" r:id="rId5"/>
+    <p:sldId id="258" r:id="rId6"/>
+    <p:sldId id="261" r:id="rId7"/>
+    <p:sldId id="259" r:id="rId8"/>
+    <p:sldId id="260" r:id="rId9"/>
+    <p:sldId id="264" r:id="rId10"/>
+    <p:sldId id="262" r:id="rId11"/>
+    <p:sldId id="265" r:id="rId12"/>
+    <p:sldId id="263" r:id="rId13"/>
+    <p:sldId id="267" r:id="rId14"/>
   </p:sldIdLst>
   <p:sldSz cx="12192000" cy="6858000"/>
   <p:notesSz cx="6858000" cy="9144000"/>
@@ -114,6 +116,11 @@
       </a:defRPr>
     </a:lvl9pPr>
   </p:defaultTextStyle>
+  <p:extLst>
+    <p:ext uri="{EFAFB233-063F-42B5-8137-9DF3F51BA10A}">
+      <p15:sldGuideLst xmlns:p15="http://schemas.microsoft.com/office/powerpoint/2012/main"/>
+    </p:ext>
+  </p:extLst>
 </p:presentation>
 </file>
 
@@ -174,7 +181,7 @@
           <a:noFill/>
           <a:extLst>
             <a:ext uri="{909E8E84-426E-40dd-AFC4-6F175D3DCCD1}">
-              <a14:hiddenFill xmlns:a14="http://schemas.microsoft.com/office/drawing/2010/main" xmlns="">
+              <a14:hiddenFill xmlns="" xmlns:a14="http://schemas.microsoft.com/office/drawing/2010/main">
                 <a:solidFill>
                   <a:srgbClr val="FFFFFF"/>
                 </a:solidFill>
@@ -233,7 +240,7 @@
             </a:ln>
             <a:extLst>
               <a:ext uri="{91240B29-F687-4f45-9708-019B960494DF}">
-                <a14:hiddenLine xmlns:a14="http://schemas.microsoft.com/office/drawing/2010/main" xmlns="" w="9525">
+                <a14:hiddenLine xmlns="" xmlns:a14="http://schemas.microsoft.com/office/drawing/2010/main" w="9525">
                   <a:solidFill>
                     <a:srgbClr val="000000"/>
                   </a:solidFill>
@@ -323,7 +330,7 @@
             </a:ln>
             <a:extLst>
               <a:ext uri="{91240B29-F687-4f45-9708-019B960494DF}">
-                <a14:hiddenLine xmlns:a14="http://schemas.microsoft.com/office/drawing/2010/main" xmlns="" w="9525">
+                <a14:hiddenLine xmlns="" xmlns:a14="http://schemas.microsoft.com/office/drawing/2010/main" w="9525">
                   <a:solidFill>
                     <a:srgbClr val="000000"/>
                   </a:solidFill>
@@ -413,7 +420,7 @@
             </a:ln>
             <a:extLst>
               <a:ext uri="{91240B29-F687-4f45-9708-019B960494DF}">
-                <a14:hiddenLine xmlns:a14="http://schemas.microsoft.com/office/drawing/2010/main" xmlns="" w="9525">
+                <a14:hiddenLine xmlns="" xmlns:a14="http://schemas.microsoft.com/office/drawing/2010/main" w="9525">
                   <a:solidFill>
                     <a:srgbClr val="000000"/>
                   </a:solidFill>
@@ -447,7 +454,7 @@
             </a:ln>
             <a:extLst>
               <a:ext uri="{91240B29-F687-4f45-9708-019B960494DF}">
-                <a14:hiddenLine xmlns:a14="http://schemas.microsoft.com/office/drawing/2010/main" xmlns="" w="9525">
+                <a14:hiddenLine xmlns="" xmlns:a14="http://schemas.microsoft.com/office/drawing/2010/main" w="9525">
                   <a:solidFill>
                     <a:srgbClr val="000000"/>
                   </a:solidFill>
@@ -537,7 +544,7 @@
             </a:ln>
             <a:extLst>
               <a:ext uri="{91240B29-F687-4f45-9708-019B960494DF}">
-                <a14:hiddenLine xmlns:a14="http://schemas.microsoft.com/office/drawing/2010/main" xmlns="" w="9525">
+                <a14:hiddenLine xmlns="" xmlns:a14="http://schemas.microsoft.com/office/drawing/2010/main" w="9525">
                   <a:solidFill>
                     <a:srgbClr val="000000"/>
                   </a:solidFill>
@@ -599,7 +606,7 @@
             </a:ln>
             <a:extLst>
               <a:ext uri="{91240B29-F687-4f45-9708-019B960494DF}">
-                <a14:hiddenLine xmlns:a14="http://schemas.microsoft.com/office/drawing/2010/main" xmlns="" w="9525">
+                <a14:hiddenLine xmlns="" xmlns:a14="http://schemas.microsoft.com/office/drawing/2010/main" w="9525">
                   <a:solidFill>
                     <a:srgbClr val="000000"/>
                   </a:solidFill>
@@ -661,7 +668,7 @@
             </a:ln>
             <a:extLst>
               <a:ext uri="{91240B29-F687-4f45-9708-019B960494DF}">
-                <a14:hiddenLine xmlns:a14="http://schemas.microsoft.com/office/drawing/2010/main" xmlns="" w="9525">
+                <a14:hiddenLine xmlns="" xmlns:a14="http://schemas.microsoft.com/office/drawing/2010/main" w="9525">
                   <a:solidFill>
                     <a:srgbClr val="000000"/>
                   </a:solidFill>
@@ -751,7 +758,7 @@
             </a:ln>
             <a:extLst>
               <a:ext uri="{91240B29-F687-4f45-9708-019B960494DF}">
-                <a14:hiddenLine xmlns:a14="http://schemas.microsoft.com/office/drawing/2010/main" xmlns="" w="9525">
+                <a14:hiddenLine xmlns="" xmlns:a14="http://schemas.microsoft.com/office/drawing/2010/main" w="9525">
                   <a:solidFill>
                     <a:srgbClr val="000000"/>
                   </a:solidFill>
@@ -813,7 +820,7 @@
             </a:ln>
             <a:extLst>
               <a:ext uri="{91240B29-F687-4f45-9708-019B960494DF}">
-                <a14:hiddenLine xmlns:a14="http://schemas.microsoft.com/office/drawing/2010/main" xmlns="" w="9525">
+                <a14:hiddenLine xmlns="" xmlns:a14="http://schemas.microsoft.com/office/drawing/2010/main" w="9525">
                   <a:solidFill>
                     <a:srgbClr val="000000"/>
                   </a:solidFill>
@@ -875,7 +882,7 @@
             </a:ln>
             <a:extLst>
               <a:ext uri="{91240B29-F687-4f45-9708-019B960494DF}">
-                <a14:hiddenLine xmlns:a14="http://schemas.microsoft.com/office/drawing/2010/main" xmlns="" w="9525">
+                <a14:hiddenLine xmlns="" xmlns:a14="http://schemas.microsoft.com/office/drawing/2010/main" w="9525">
                   <a:solidFill>
                     <a:srgbClr val="000000"/>
                   </a:solidFill>
@@ -965,7 +972,7 @@
             </a:ln>
             <a:extLst>
               <a:ext uri="{91240B29-F687-4f45-9708-019B960494DF}">
-                <a14:hiddenLine xmlns:a14="http://schemas.microsoft.com/office/drawing/2010/main" xmlns="" w="9525">
+                <a14:hiddenLine xmlns="" xmlns:a14="http://schemas.microsoft.com/office/drawing/2010/main" w="9525">
                   <a:solidFill>
                     <a:srgbClr val="000000"/>
                   </a:solidFill>
@@ -1055,7 +1062,7 @@
             </a:ln>
             <a:extLst>
               <a:ext uri="{91240B29-F687-4f45-9708-019B960494DF}">
-                <a14:hiddenLine xmlns:a14="http://schemas.microsoft.com/office/drawing/2010/main" xmlns="" w="9525">
+                <a14:hiddenLine xmlns="" xmlns:a14="http://schemas.microsoft.com/office/drawing/2010/main" w="9525">
                   <a:solidFill>
                     <a:srgbClr val="000000"/>
                   </a:solidFill>
@@ -1117,7 +1124,7 @@
             </a:ln>
             <a:extLst>
               <a:ext uri="{91240B29-F687-4f45-9708-019B960494DF}">
-                <a14:hiddenLine xmlns:a14="http://schemas.microsoft.com/office/drawing/2010/main" xmlns="" w="9525">
+                <a14:hiddenLine xmlns="" xmlns:a14="http://schemas.microsoft.com/office/drawing/2010/main" w="9525">
                   <a:solidFill>
                     <a:srgbClr val="000000"/>
                   </a:solidFill>
@@ -1227,7 +1234,7 @@
             </a:ln>
             <a:extLst>
               <a:ext uri="{91240B29-F687-4f45-9708-019B960494DF}">
-                <a14:hiddenLine xmlns:a14="http://schemas.microsoft.com/office/drawing/2010/main" xmlns="" w="9525">
+                <a14:hiddenLine xmlns="" xmlns:a14="http://schemas.microsoft.com/office/drawing/2010/main" w="9525">
                   <a:solidFill>
                     <a:srgbClr val="000000"/>
                   </a:solidFill>
@@ -1289,7 +1296,7 @@
             </a:ln>
             <a:extLst>
               <a:ext uri="{91240B29-F687-4f45-9708-019B960494DF}">
-                <a14:hiddenLine xmlns:a14="http://schemas.microsoft.com/office/drawing/2010/main" xmlns="" w="9525">
+                <a14:hiddenLine xmlns="" xmlns:a14="http://schemas.microsoft.com/office/drawing/2010/main" w="9525">
                   <a:solidFill>
                     <a:srgbClr val="000000"/>
                   </a:solidFill>
@@ -1379,7 +1386,7 @@
             </a:ln>
             <a:extLst>
               <a:ext uri="{91240B29-F687-4f45-9708-019B960494DF}">
-                <a14:hiddenLine xmlns:a14="http://schemas.microsoft.com/office/drawing/2010/main" xmlns="" w="9525">
+                <a14:hiddenLine xmlns="" xmlns:a14="http://schemas.microsoft.com/office/drawing/2010/main" w="9525">
                   <a:solidFill>
                     <a:srgbClr val="000000"/>
                   </a:solidFill>
@@ -1469,7 +1476,7 @@
             </a:ln>
             <a:extLst>
               <a:ext uri="{91240B29-F687-4f45-9708-019B960494DF}">
-                <a14:hiddenLine xmlns:a14="http://schemas.microsoft.com/office/drawing/2010/main" xmlns="" w="9525">
+                <a14:hiddenLine xmlns="" xmlns:a14="http://schemas.microsoft.com/office/drawing/2010/main" w="9525">
                   <a:solidFill>
                     <a:srgbClr val="000000"/>
                   </a:solidFill>
@@ -1531,7 +1538,7 @@
             </a:ln>
             <a:extLst>
               <a:ext uri="{91240B29-F687-4f45-9708-019B960494DF}">
-                <a14:hiddenLine xmlns:a14="http://schemas.microsoft.com/office/drawing/2010/main" xmlns="" w="9525">
+                <a14:hiddenLine xmlns="" xmlns:a14="http://schemas.microsoft.com/office/drawing/2010/main" w="9525">
                   <a:solidFill>
                     <a:srgbClr val="000000"/>
                   </a:solidFill>
@@ -1621,7 +1628,7 @@
             </a:ln>
             <a:extLst>
               <a:ext uri="{91240B29-F687-4f45-9708-019B960494DF}">
-                <a14:hiddenLine xmlns:a14="http://schemas.microsoft.com/office/drawing/2010/main" xmlns="" w="9525">
+                <a14:hiddenLine xmlns="" xmlns:a14="http://schemas.microsoft.com/office/drawing/2010/main" w="9525">
                   <a:solidFill>
                     <a:srgbClr val="000000"/>
                   </a:solidFill>
@@ -1711,7 +1718,7 @@
             </a:ln>
             <a:extLst>
               <a:ext uri="{91240B29-F687-4f45-9708-019B960494DF}">
-                <a14:hiddenLine xmlns:a14="http://schemas.microsoft.com/office/drawing/2010/main" xmlns="" w="9525">
+                <a14:hiddenLine xmlns="" xmlns:a14="http://schemas.microsoft.com/office/drawing/2010/main" w="9525">
                   <a:solidFill>
                     <a:srgbClr val="000000"/>
                   </a:solidFill>
@@ -1767,7 +1774,7 @@
             </a:ln>
             <a:extLst>
               <a:ext uri="{91240B29-F687-4f45-9708-019B960494DF}">
-                <a14:hiddenLine xmlns:a14="http://schemas.microsoft.com/office/drawing/2010/main" xmlns="" w="9525">
+                <a14:hiddenLine xmlns="" xmlns:a14="http://schemas.microsoft.com/office/drawing/2010/main" w="9525">
                   <a:solidFill>
                     <a:srgbClr val="000000"/>
                   </a:solidFill>
@@ -1857,7 +1864,7 @@
             </a:ln>
             <a:extLst>
               <a:ext uri="{91240B29-F687-4f45-9708-019B960494DF}">
-                <a14:hiddenLine xmlns:a14="http://schemas.microsoft.com/office/drawing/2010/main" xmlns="" w="9525">
+                <a14:hiddenLine xmlns="" xmlns:a14="http://schemas.microsoft.com/office/drawing/2010/main" w="9525">
                   <a:solidFill>
                     <a:srgbClr val="000000"/>
                   </a:solidFill>
@@ -1913,7 +1920,7 @@
             </a:ln>
             <a:extLst>
               <a:ext uri="{91240B29-F687-4f45-9708-019B960494DF}">
-                <a14:hiddenLine xmlns:a14="http://schemas.microsoft.com/office/drawing/2010/main" xmlns="" w="9525">
+                <a14:hiddenLine xmlns="" xmlns:a14="http://schemas.microsoft.com/office/drawing/2010/main" w="9525">
                   <a:solidFill>
                     <a:srgbClr val="000000"/>
                   </a:solidFill>
@@ -2003,7 +2010,7 @@
             </a:ln>
             <a:extLst>
               <a:ext uri="{91240B29-F687-4f45-9708-019B960494DF}">
-                <a14:hiddenLine xmlns:a14="http://schemas.microsoft.com/office/drawing/2010/main" xmlns="" w="9525">
+                <a14:hiddenLine xmlns="" xmlns:a14="http://schemas.microsoft.com/office/drawing/2010/main" w="9525">
                   <a:solidFill>
                     <a:srgbClr val="000000"/>
                   </a:solidFill>
@@ -2071,7 +2078,7 @@
             </a:ln>
             <a:extLst>
               <a:ext uri="{91240B29-F687-4f45-9708-019B960494DF}">
-                <a14:hiddenLine xmlns:a14="http://schemas.microsoft.com/office/drawing/2010/main" xmlns="" w="9525">
+                <a14:hiddenLine xmlns="" xmlns:a14="http://schemas.microsoft.com/office/drawing/2010/main" w="9525">
                   <a:solidFill>
                     <a:srgbClr val="000000"/>
                   </a:solidFill>
@@ -2161,7 +2168,7 @@
             </a:ln>
             <a:extLst>
               <a:ext uri="{91240B29-F687-4f45-9708-019B960494DF}">
-                <a14:hiddenLine xmlns:a14="http://schemas.microsoft.com/office/drawing/2010/main" xmlns="" w="9525">
+                <a14:hiddenLine xmlns="" xmlns:a14="http://schemas.microsoft.com/office/drawing/2010/main" w="9525">
                   <a:solidFill>
                     <a:srgbClr val="000000"/>
                   </a:solidFill>
@@ -2229,7 +2236,7 @@
             </a:ln>
             <a:extLst>
               <a:ext uri="{91240B29-F687-4f45-9708-019B960494DF}">
-                <a14:hiddenLine xmlns:a14="http://schemas.microsoft.com/office/drawing/2010/main" xmlns="" w="9525">
+                <a14:hiddenLine xmlns="" xmlns:a14="http://schemas.microsoft.com/office/drawing/2010/main" w="9525">
                   <a:solidFill>
                     <a:srgbClr val="000000"/>
                   </a:solidFill>
@@ -2319,7 +2326,7 @@
             </a:ln>
             <a:extLst>
               <a:ext uri="{91240B29-F687-4f45-9708-019B960494DF}">
-                <a14:hiddenLine xmlns:a14="http://schemas.microsoft.com/office/drawing/2010/main" xmlns="" w="9525">
+                <a14:hiddenLine xmlns="" xmlns:a14="http://schemas.microsoft.com/office/drawing/2010/main" w="9525">
                   <a:solidFill>
                     <a:srgbClr val="000000"/>
                   </a:solidFill>
@@ -2353,7 +2360,7 @@
             </a:ln>
             <a:extLst>
               <a:ext uri="{91240B29-F687-4f45-9708-019B960494DF}">
-                <a14:hiddenLine xmlns:a14="http://schemas.microsoft.com/office/drawing/2010/main" xmlns="" w="9525">
+                <a14:hiddenLine xmlns="" xmlns:a14="http://schemas.microsoft.com/office/drawing/2010/main" w="9525">
                   <a:solidFill>
                     <a:srgbClr val="000000"/>
                   </a:solidFill>
@@ -2443,7 +2450,7 @@
             </a:ln>
             <a:extLst>
               <a:ext uri="{91240B29-F687-4f45-9708-019B960494DF}">
-                <a14:hiddenLine xmlns:a14="http://schemas.microsoft.com/office/drawing/2010/main" xmlns="" w="9525">
+                <a14:hiddenLine xmlns="" xmlns:a14="http://schemas.microsoft.com/office/drawing/2010/main" w="9525">
                   <a:solidFill>
                     <a:srgbClr val="000000"/>
                   </a:solidFill>
@@ -2505,7 +2512,7 @@
             </a:ln>
             <a:extLst>
               <a:ext uri="{91240B29-F687-4f45-9708-019B960494DF}">
-                <a14:hiddenLine xmlns:a14="http://schemas.microsoft.com/office/drawing/2010/main" xmlns="" w="9525">
+                <a14:hiddenLine xmlns="" xmlns:a14="http://schemas.microsoft.com/office/drawing/2010/main" w="9525">
                   <a:solidFill>
                     <a:srgbClr val="000000"/>
                   </a:solidFill>
@@ -2567,7 +2574,7 @@
             </a:ln>
             <a:extLst>
               <a:ext uri="{91240B29-F687-4f45-9708-019B960494DF}">
-                <a14:hiddenLine xmlns:a14="http://schemas.microsoft.com/office/drawing/2010/main" xmlns="" w="9525">
+                <a14:hiddenLine xmlns="" xmlns:a14="http://schemas.microsoft.com/office/drawing/2010/main" w="9525">
                   <a:solidFill>
                     <a:srgbClr val="000000"/>
                   </a:solidFill>
@@ -2657,7 +2664,7 @@
             </a:ln>
             <a:extLst>
               <a:ext uri="{91240B29-F687-4f45-9708-019B960494DF}">
-                <a14:hiddenLine xmlns:a14="http://schemas.microsoft.com/office/drawing/2010/main" xmlns="" w="9525">
+                <a14:hiddenLine xmlns="" xmlns:a14="http://schemas.microsoft.com/office/drawing/2010/main" w="9525">
                   <a:solidFill>
                     <a:srgbClr val="000000"/>
                   </a:solidFill>
@@ -2725,7 +2732,7 @@
             </a:ln>
             <a:extLst>
               <a:ext uri="{91240B29-F687-4f45-9708-019B960494DF}">
-                <a14:hiddenLine xmlns:a14="http://schemas.microsoft.com/office/drawing/2010/main" xmlns="" w="9525">
+                <a14:hiddenLine xmlns="" xmlns:a14="http://schemas.microsoft.com/office/drawing/2010/main" w="9525">
                   <a:solidFill>
                     <a:srgbClr val="000000"/>
                   </a:solidFill>
@@ -2787,7 +2794,7 @@
             </a:ln>
             <a:extLst>
               <a:ext uri="{91240B29-F687-4f45-9708-019B960494DF}">
-                <a14:hiddenLine xmlns:a14="http://schemas.microsoft.com/office/drawing/2010/main" xmlns="" w="9525">
+                <a14:hiddenLine xmlns="" xmlns:a14="http://schemas.microsoft.com/office/drawing/2010/main" w="9525">
                   <a:solidFill>
                     <a:srgbClr val="000000"/>
                   </a:solidFill>
@@ -2877,7 +2884,7 @@
             </a:ln>
             <a:extLst>
               <a:ext uri="{91240B29-F687-4f45-9708-019B960494DF}">
-                <a14:hiddenLine xmlns:a14="http://schemas.microsoft.com/office/drawing/2010/main" xmlns="" w="9525">
+                <a14:hiddenLine xmlns="" xmlns:a14="http://schemas.microsoft.com/office/drawing/2010/main" w="9525">
                   <a:solidFill>
                     <a:srgbClr val="000000"/>
                   </a:solidFill>
@@ -2939,7 +2946,7 @@
             </a:ln>
             <a:extLst>
               <a:ext uri="{91240B29-F687-4f45-9708-019B960494DF}">
-                <a14:hiddenLine xmlns:a14="http://schemas.microsoft.com/office/drawing/2010/main" xmlns="" w="9525">
+                <a14:hiddenLine xmlns="" xmlns:a14="http://schemas.microsoft.com/office/drawing/2010/main" w="9525">
                   <a:solidFill>
                     <a:srgbClr val="000000"/>
                   </a:solidFill>
@@ -3029,7 +3036,7 @@
             </a:ln>
             <a:extLst>
               <a:ext uri="{91240B29-F687-4f45-9708-019B960494DF}">
-                <a14:hiddenLine xmlns:a14="http://schemas.microsoft.com/office/drawing/2010/main" xmlns="" w="9525">
+                <a14:hiddenLine xmlns="" xmlns:a14="http://schemas.microsoft.com/office/drawing/2010/main" w="9525">
                   <a:solidFill>
                     <a:srgbClr val="000000"/>
                   </a:solidFill>
@@ -3091,7 +3098,7 @@
             </a:ln>
             <a:extLst>
               <a:ext uri="{91240B29-F687-4f45-9708-019B960494DF}">
-                <a14:hiddenLine xmlns:a14="http://schemas.microsoft.com/office/drawing/2010/main" xmlns="" w="9525">
+                <a14:hiddenLine xmlns="" xmlns:a14="http://schemas.microsoft.com/office/drawing/2010/main" w="9525">
                   <a:solidFill>
                     <a:srgbClr val="000000"/>
                   </a:solidFill>
@@ -3181,7 +3188,7 @@
             </a:ln>
             <a:extLst>
               <a:ext uri="{91240B29-F687-4f45-9708-019B960494DF}">
-                <a14:hiddenLine xmlns:a14="http://schemas.microsoft.com/office/drawing/2010/main" xmlns="" w="9525">
+                <a14:hiddenLine xmlns="" xmlns:a14="http://schemas.microsoft.com/office/drawing/2010/main" w="9525">
                   <a:solidFill>
                     <a:srgbClr val="000000"/>
                   </a:solidFill>
@@ -3215,7 +3222,7 @@
             </a:ln>
             <a:extLst>
               <a:ext uri="{91240B29-F687-4f45-9708-019B960494DF}">
-                <a14:hiddenLine xmlns:a14="http://schemas.microsoft.com/office/drawing/2010/main" xmlns="" w="9525">
+                <a14:hiddenLine xmlns="" xmlns:a14="http://schemas.microsoft.com/office/drawing/2010/main" w="9525">
                   <a:solidFill>
                     <a:srgbClr val="000000"/>
                   </a:solidFill>
@@ -3280,7 +3287,7 @@
             </a:ln>
             <a:extLst>
               <a:ext uri="{91240B29-F687-4f45-9708-019B960494DF}">
-                <a14:hiddenLine xmlns:a14="http://schemas.microsoft.com/office/drawing/2010/main" xmlns="" w="9525">
+                <a14:hiddenLine xmlns="" xmlns:a14="http://schemas.microsoft.com/office/drawing/2010/main" w="9525">
                   <a:solidFill>
                     <a:srgbClr val="000000"/>
                   </a:solidFill>
@@ -3370,7 +3377,7 @@
             </a:ln>
             <a:extLst>
               <a:ext uri="{91240B29-F687-4f45-9708-019B960494DF}">
-                <a14:hiddenLine xmlns:a14="http://schemas.microsoft.com/office/drawing/2010/main" xmlns="" w="9525">
+                <a14:hiddenLine xmlns="" xmlns:a14="http://schemas.microsoft.com/office/drawing/2010/main" w="9525">
                   <a:solidFill>
                     <a:srgbClr val="000000"/>
                   </a:solidFill>
@@ -3432,7 +3439,7 @@
             </a:ln>
             <a:extLst>
               <a:ext uri="{91240B29-F687-4f45-9708-019B960494DF}">
-                <a14:hiddenLine xmlns:a14="http://schemas.microsoft.com/office/drawing/2010/main" xmlns="" w="9525">
+                <a14:hiddenLine xmlns="" xmlns:a14="http://schemas.microsoft.com/office/drawing/2010/main" w="9525">
                   <a:solidFill>
                     <a:srgbClr val="000000"/>
                   </a:solidFill>
@@ -3522,7 +3529,7 @@
             </a:ln>
             <a:extLst>
               <a:ext uri="{91240B29-F687-4f45-9708-019B960494DF}">
-                <a14:hiddenLine xmlns:a14="http://schemas.microsoft.com/office/drawing/2010/main" xmlns="" w="9525">
+                <a14:hiddenLine xmlns="" xmlns:a14="http://schemas.microsoft.com/office/drawing/2010/main" w="9525">
                   <a:solidFill>
                     <a:srgbClr val="000000"/>
                   </a:solidFill>
@@ -3612,7 +3619,7 @@
             </a:ln>
             <a:extLst>
               <a:ext uri="{91240B29-F687-4f45-9708-019B960494DF}">
-                <a14:hiddenLine xmlns:a14="http://schemas.microsoft.com/office/drawing/2010/main" xmlns="" w="9525">
+                <a14:hiddenLine xmlns="" xmlns:a14="http://schemas.microsoft.com/office/drawing/2010/main" w="9525">
                   <a:solidFill>
                     <a:srgbClr val="000000"/>
                   </a:solidFill>
@@ -3677,7 +3684,7 @@
             </a:ln>
             <a:extLst>
               <a:ext uri="{91240B29-F687-4f45-9708-019B960494DF}">
-                <a14:hiddenLine xmlns:a14="http://schemas.microsoft.com/office/drawing/2010/main" xmlns="" w="9525">
+                <a14:hiddenLine xmlns="" xmlns:a14="http://schemas.microsoft.com/office/drawing/2010/main" w="9525">
                   <a:solidFill>
                     <a:srgbClr val="000000"/>
                   </a:solidFill>
@@ -3739,7 +3746,7 @@
             </a:ln>
             <a:extLst>
               <a:ext uri="{91240B29-F687-4f45-9708-019B960494DF}">
-                <a14:hiddenLine xmlns:a14="http://schemas.microsoft.com/office/drawing/2010/main" xmlns="" w="9525">
+                <a14:hiddenLine xmlns="" xmlns:a14="http://schemas.microsoft.com/office/drawing/2010/main" w="9525">
                   <a:solidFill>
                     <a:srgbClr val="000000"/>
                   </a:solidFill>
@@ -3829,7 +3836,7 @@
             </a:ln>
             <a:extLst>
               <a:ext uri="{91240B29-F687-4f45-9708-019B960494DF}">
-                <a14:hiddenLine xmlns:a14="http://schemas.microsoft.com/office/drawing/2010/main" xmlns="" w="9525">
+                <a14:hiddenLine xmlns="" xmlns:a14="http://schemas.microsoft.com/office/drawing/2010/main" w="9525">
                   <a:solidFill>
                     <a:srgbClr val="000000"/>
                   </a:solidFill>
@@ -3919,7 +3926,7 @@
             </a:ln>
             <a:extLst>
               <a:ext uri="{91240B29-F687-4f45-9708-019B960494DF}">
-                <a14:hiddenLine xmlns:a14="http://schemas.microsoft.com/office/drawing/2010/main" xmlns="" w="9525">
+                <a14:hiddenLine xmlns="" xmlns:a14="http://schemas.microsoft.com/office/drawing/2010/main" w="9525">
                   <a:solidFill>
                     <a:srgbClr val="000000"/>
                   </a:solidFill>
@@ -3981,7 +3988,7 @@
             </a:ln>
             <a:extLst>
               <a:ext uri="{91240B29-F687-4f45-9708-019B960494DF}">
-                <a14:hiddenLine xmlns:a14="http://schemas.microsoft.com/office/drawing/2010/main" xmlns="" w="9525">
+                <a14:hiddenLine xmlns="" xmlns:a14="http://schemas.microsoft.com/office/drawing/2010/main" w="9525">
                   <a:solidFill>
                     <a:srgbClr val="000000"/>
                   </a:solidFill>
@@ -4101,7 +4108,7 @@
             </a:ln>
             <a:extLst>
               <a:ext uri="{91240B29-F687-4f45-9708-019B960494DF}">
-                <a14:hiddenLine xmlns:a14="http://schemas.microsoft.com/office/drawing/2010/main" xmlns="" w="9525">
+                <a14:hiddenLine xmlns="" xmlns:a14="http://schemas.microsoft.com/office/drawing/2010/main" w="9525">
                   <a:solidFill>
                     <a:srgbClr val="000000"/>
                   </a:solidFill>
@@ -4169,7 +4176,7 @@
             </a:ln>
             <a:extLst>
               <a:ext uri="{91240B29-F687-4f45-9708-019B960494DF}">
-                <a14:hiddenLine xmlns:a14="http://schemas.microsoft.com/office/drawing/2010/main" xmlns="" w="9525">
+                <a14:hiddenLine xmlns="" xmlns:a14="http://schemas.microsoft.com/office/drawing/2010/main" w="9525">
                   <a:solidFill>
                     <a:srgbClr val="000000"/>
                   </a:solidFill>
@@ -4259,7 +4266,7 @@
             </a:ln>
             <a:extLst>
               <a:ext uri="{91240B29-F687-4f45-9708-019B960494DF}">
-                <a14:hiddenLine xmlns:a14="http://schemas.microsoft.com/office/drawing/2010/main" xmlns="" w="9525">
+                <a14:hiddenLine xmlns="" xmlns:a14="http://schemas.microsoft.com/office/drawing/2010/main" w="9525">
                   <a:solidFill>
                     <a:srgbClr val="000000"/>
                   </a:solidFill>
@@ -4399,7 +4406,7 @@
           <a:p>
             <a:fld id="{34506231-73E2-D044-86C2-B0CD50441F1B}" type="datetimeFigureOut">
               <a:rPr lang="en-US" smtClean="0"/>
-              <a:t>1/14/19</a:t>
+              <a:t>1/28/19</a:t>
             </a:fld>
             <a:endParaRPr lang="en-US" dirty="0"/>
           </a:p>
@@ -4665,7 +4672,7 @@
           <a:p>
             <a:fld id="{34506231-73E2-D044-86C2-B0CD50441F1B}" type="datetimeFigureOut">
               <a:rPr lang="en-US" smtClean="0"/>
-              <a:t>1/14/19</a:t>
+              <a:t>1/28/19</a:t>
             </a:fld>
             <a:endParaRPr lang="en-US" dirty="0"/>
           </a:p>
@@ -4861,7 +4868,7 @@
           <a:p>
             <a:fld id="{34506231-73E2-D044-86C2-B0CD50441F1B}" type="datetimeFigureOut">
               <a:rPr lang="en-US" smtClean="0"/>
-              <a:t>1/14/19</a:t>
+              <a:t>1/28/19</a:t>
             </a:fld>
             <a:endParaRPr lang="en-US" dirty="0"/>
           </a:p>
@@ -5124,7 +5131,7 @@
           <a:p>
             <a:fld id="{34506231-73E2-D044-86C2-B0CD50441F1B}" type="datetimeFigureOut">
               <a:rPr lang="en-US" smtClean="0"/>
-              <a:t>1/14/19</a:t>
+              <a:t>1/28/19</a:t>
             </a:fld>
             <a:endParaRPr lang="en-US" dirty="0"/>
           </a:p>
@@ -5558,7 +5565,7 @@
           <a:p>
             <a:fld id="{34506231-73E2-D044-86C2-B0CD50441F1B}" type="datetimeFigureOut">
               <a:rPr lang="en-US" smtClean="0"/>
-              <a:t>1/14/19</a:t>
+              <a:t>1/28/19</a:t>
             </a:fld>
             <a:endParaRPr lang="en-US" dirty="0"/>
           </a:p>
@@ -6104,7 +6111,7 @@
           <a:p>
             <a:fld id="{34506231-73E2-D044-86C2-B0CD50441F1B}" type="datetimeFigureOut">
               <a:rPr lang="en-US" smtClean="0"/>
-              <a:t>1/14/19</a:t>
+              <a:t>1/28/19</a:t>
             </a:fld>
             <a:endParaRPr lang="en-US" dirty="0"/>
           </a:p>
@@ -6821,7 +6828,7 @@
           <a:p>
             <a:fld id="{34506231-73E2-D044-86C2-B0CD50441F1B}" type="datetimeFigureOut">
               <a:rPr lang="en-US" smtClean="0"/>
-              <a:t>1/14/19</a:t>
+              <a:t>1/28/19</a:t>
             </a:fld>
             <a:endParaRPr lang="en-US" dirty="0"/>
           </a:p>
@@ -6991,7 +6998,7 @@
           <a:p>
             <a:fld id="{34506231-73E2-D044-86C2-B0CD50441F1B}" type="datetimeFigureOut">
               <a:rPr lang="en-US" smtClean="0"/>
-              <a:t>1/14/19</a:t>
+              <a:t>1/28/19</a:t>
             </a:fld>
             <a:endParaRPr lang="en-US" dirty="0"/>
           </a:p>
@@ -7171,7 +7178,7 @@
           <a:p>
             <a:fld id="{34506231-73E2-D044-86C2-B0CD50441F1B}" type="datetimeFigureOut">
               <a:rPr lang="en-US" smtClean="0"/>
-              <a:t>1/14/19</a:t>
+              <a:t>1/28/19</a:t>
             </a:fld>
             <a:endParaRPr lang="en-US" dirty="0"/>
           </a:p>
@@ -7341,7 +7348,7 @@
           <a:p>
             <a:fld id="{34506231-73E2-D044-86C2-B0CD50441F1B}" type="datetimeFigureOut">
               <a:rPr lang="en-US" smtClean="0"/>
-              <a:t>1/14/19</a:t>
+              <a:t>1/28/19</a:t>
             </a:fld>
             <a:endParaRPr lang="en-US" dirty="0"/>
           </a:p>
@@ -7591,7 +7598,7 @@
           <a:p>
             <a:fld id="{34506231-73E2-D044-86C2-B0CD50441F1B}" type="datetimeFigureOut">
               <a:rPr lang="en-US" smtClean="0"/>
-              <a:t>1/14/19</a:t>
+              <a:t>1/28/19</a:t>
             </a:fld>
             <a:endParaRPr lang="en-US" dirty="0"/>
           </a:p>
@@ -7823,7 +7830,7 @@
           <a:p>
             <a:fld id="{34506231-73E2-D044-86C2-B0CD50441F1B}" type="datetimeFigureOut">
               <a:rPr lang="en-US" smtClean="0"/>
-              <a:t>1/14/19</a:t>
+              <a:t>1/28/19</a:t>
             </a:fld>
             <a:endParaRPr lang="en-US" dirty="0"/>
           </a:p>
@@ -8204,7 +8211,7 @@
           <a:p>
             <a:fld id="{34506231-73E2-D044-86C2-B0CD50441F1B}" type="datetimeFigureOut">
               <a:rPr lang="en-US" smtClean="0"/>
-              <a:t>1/14/19</a:t>
+              <a:t>1/28/19</a:t>
             </a:fld>
             <a:endParaRPr lang="en-US" dirty="0"/>
           </a:p>
@@ -8322,7 +8329,7 @@
           <a:p>
             <a:fld id="{34506231-73E2-D044-86C2-B0CD50441F1B}" type="datetimeFigureOut">
               <a:rPr lang="en-US" smtClean="0"/>
-              <a:t>1/14/19</a:t>
+              <a:t>1/28/19</a:t>
             </a:fld>
             <a:endParaRPr lang="en-US" dirty="0"/>
           </a:p>
@@ -8417,7 +8424,7 @@
           <a:p>
             <a:fld id="{34506231-73E2-D044-86C2-B0CD50441F1B}" type="datetimeFigureOut">
               <a:rPr lang="en-US" smtClean="0"/>
-              <a:t>1/14/19</a:t>
+              <a:t>1/28/19</a:t>
             </a:fld>
             <a:endParaRPr lang="en-US" dirty="0"/>
           </a:p>
@@ -8666,7 +8673,7 @@
           <a:p>
             <a:fld id="{34506231-73E2-D044-86C2-B0CD50441F1B}" type="datetimeFigureOut">
               <a:rPr lang="en-US" smtClean="0"/>
-              <a:t>1/14/19</a:t>
+              <a:t>1/28/19</a:t>
             </a:fld>
             <a:endParaRPr lang="en-US" dirty="0"/>
           </a:p>
@@ -8945,7 +8952,7 @@
           <a:p>
             <a:fld id="{34506231-73E2-D044-86C2-B0CD50441F1B}" type="datetimeFigureOut">
               <a:rPr lang="en-US" smtClean="0"/>
-              <a:t>1/14/19</a:t>
+              <a:t>1/28/19</a:t>
             </a:fld>
             <a:endParaRPr lang="en-US" dirty="0"/>
           </a:p>
@@ -9068,7 +9075,7 @@
           <a:noFill/>
           <a:extLst>
             <a:ext uri="{909E8E84-426E-40dd-AFC4-6F175D3DCCD1}">
-              <a14:hiddenFill xmlns:a14="http://schemas.microsoft.com/office/drawing/2010/main" xmlns="">
+              <a14:hiddenFill xmlns="" xmlns:a14="http://schemas.microsoft.com/office/drawing/2010/main">
                 <a:solidFill>
                   <a:srgbClr val="FFFFFF"/>
                 </a:solidFill>
@@ -9142,7 +9149,7 @@
               </a:ln>
               <a:extLst>
                 <a:ext uri="{91240B29-F687-4f45-9708-019B960494DF}">
-                  <a14:hiddenLine xmlns:a14="http://schemas.microsoft.com/office/drawing/2010/main" xmlns="" w="9525">
+                  <a14:hiddenLine xmlns="" xmlns:a14="http://schemas.microsoft.com/office/drawing/2010/main" w="9525">
                     <a:solidFill>
                       <a:srgbClr val="000000"/>
                     </a:solidFill>
@@ -9232,7 +9239,7 @@
               </a:ln>
               <a:extLst>
                 <a:ext uri="{91240B29-F687-4f45-9708-019B960494DF}">
-                  <a14:hiddenLine xmlns:a14="http://schemas.microsoft.com/office/drawing/2010/main" xmlns="" w="9525">
+                  <a14:hiddenLine xmlns="" xmlns:a14="http://schemas.microsoft.com/office/drawing/2010/main" w="9525">
                     <a:solidFill>
                       <a:srgbClr val="000000"/>
                     </a:solidFill>
@@ -9322,7 +9329,7 @@
               </a:ln>
               <a:extLst>
                 <a:ext uri="{91240B29-F687-4f45-9708-019B960494DF}">
-                  <a14:hiddenLine xmlns:a14="http://schemas.microsoft.com/office/drawing/2010/main" xmlns="" w="9525">
+                  <a14:hiddenLine xmlns="" xmlns:a14="http://schemas.microsoft.com/office/drawing/2010/main" w="9525">
                     <a:solidFill>
                       <a:srgbClr val="000000"/>
                     </a:solidFill>
@@ -9384,7 +9391,7 @@
               </a:ln>
               <a:extLst>
                 <a:ext uri="{91240B29-F687-4f45-9708-019B960494DF}">
-                  <a14:hiddenLine xmlns:a14="http://schemas.microsoft.com/office/drawing/2010/main" xmlns="" w="9525">
+                  <a14:hiddenLine xmlns="" xmlns:a14="http://schemas.microsoft.com/office/drawing/2010/main" w="9525">
                     <a:solidFill>
                       <a:srgbClr val="000000"/>
                     </a:solidFill>
@@ -9474,7 +9481,7 @@
               </a:ln>
               <a:extLst>
                 <a:ext uri="{91240B29-F687-4f45-9708-019B960494DF}">
-                  <a14:hiddenLine xmlns:a14="http://schemas.microsoft.com/office/drawing/2010/main" xmlns="" w="9525">
+                  <a14:hiddenLine xmlns="" xmlns:a14="http://schemas.microsoft.com/office/drawing/2010/main" w="9525">
                     <a:solidFill>
                       <a:srgbClr val="000000"/>
                     </a:solidFill>
@@ -9536,7 +9543,7 @@
               </a:ln>
               <a:extLst>
                 <a:ext uri="{91240B29-F687-4f45-9708-019B960494DF}">
-                  <a14:hiddenLine xmlns:a14="http://schemas.microsoft.com/office/drawing/2010/main" xmlns="" w="9525">
+                  <a14:hiddenLine xmlns="" xmlns:a14="http://schemas.microsoft.com/office/drawing/2010/main" w="9525">
                     <a:solidFill>
                       <a:srgbClr val="000000"/>
                     </a:solidFill>
@@ -9598,7 +9605,7 @@
               </a:ln>
               <a:extLst>
                 <a:ext uri="{91240B29-F687-4f45-9708-019B960494DF}">
-                  <a14:hiddenLine xmlns:a14="http://schemas.microsoft.com/office/drawing/2010/main" xmlns="" w="9525">
+                  <a14:hiddenLine xmlns="" xmlns:a14="http://schemas.microsoft.com/office/drawing/2010/main" w="9525">
                     <a:solidFill>
                       <a:srgbClr val="000000"/>
                     </a:solidFill>
@@ -9688,7 +9695,7 @@
               </a:ln>
               <a:extLst>
                 <a:ext uri="{91240B29-F687-4f45-9708-019B960494DF}">
-                  <a14:hiddenLine xmlns:a14="http://schemas.microsoft.com/office/drawing/2010/main" xmlns="" w="9525">
+                  <a14:hiddenLine xmlns="" xmlns:a14="http://schemas.microsoft.com/office/drawing/2010/main" w="9525">
                     <a:solidFill>
                       <a:srgbClr val="000000"/>
                     </a:solidFill>
@@ -9778,7 +9785,7 @@
               </a:ln>
               <a:extLst>
                 <a:ext uri="{91240B29-F687-4f45-9708-019B960494DF}">
-                  <a14:hiddenLine xmlns:a14="http://schemas.microsoft.com/office/drawing/2010/main" xmlns="" w="9525">
+                  <a14:hiddenLine xmlns="" xmlns:a14="http://schemas.microsoft.com/office/drawing/2010/main" w="9525">
                     <a:solidFill>
                       <a:srgbClr val="000000"/>
                     </a:solidFill>
@@ -9840,7 +9847,7 @@
               </a:ln>
               <a:extLst>
                 <a:ext uri="{91240B29-F687-4f45-9708-019B960494DF}">
-                  <a14:hiddenLine xmlns:a14="http://schemas.microsoft.com/office/drawing/2010/main" xmlns="" w="9525">
+                  <a14:hiddenLine xmlns="" xmlns:a14="http://schemas.microsoft.com/office/drawing/2010/main" w="9525">
                     <a:solidFill>
                       <a:srgbClr val="000000"/>
                     </a:solidFill>
@@ -9950,7 +9957,7 @@
               </a:ln>
               <a:extLst>
                 <a:ext uri="{91240B29-F687-4f45-9708-019B960494DF}">
-                  <a14:hiddenLine xmlns:a14="http://schemas.microsoft.com/office/drawing/2010/main" xmlns="" w="9525">
+                  <a14:hiddenLine xmlns="" xmlns:a14="http://schemas.microsoft.com/office/drawing/2010/main" w="9525">
                     <a:solidFill>
                       <a:srgbClr val="000000"/>
                     </a:solidFill>
@@ -10034,7 +10041,7 @@
               </a:ln>
               <a:extLst>
                 <a:ext uri="{91240B29-F687-4f45-9708-019B960494DF}">
-                  <a14:hiddenLine xmlns:a14="http://schemas.microsoft.com/office/drawing/2010/main" xmlns="" w="9525">
+                  <a14:hiddenLine xmlns="" xmlns:a14="http://schemas.microsoft.com/office/drawing/2010/main" w="9525">
                     <a:solidFill>
                       <a:srgbClr val="000000"/>
                     </a:solidFill>
@@ -10096,7 +10103,7 @@
               </a:ln>
               <a:extLst>
                 <a:ext uri="{91240B29-F687-4f45-9708-019B960494DF}">
-                  <a14:hiddenLine xmlns:a14="http://schemas.microsoft.com/office/drawing/2010/main" xmlns="" w="9525">
+                  <a14:hiddenLine xmlns="" xmlns:a14="http://schemas.microsoft.com/office/drawing/2010/main" w="9525">
                     <a:solidFill>
                       <a:srgbClr val="000000"/>
                     </a:solidFill>
@@ -10158,7 +10165,7 @@
               </a:ln>
               <a:extLst>
                 <a:ext uri="{91240B29-F687-4f45-9708-019B960494DF}">
-                  <a14:hiddenLine xmlns:a14="http://schemas.microsoft.com/office/drawing/2010/main" xmlns="" w="9525">
+                  <a14:hiddenLine xmlns="" xmlns:a14="http://schemas.microsoft.com/office/drawing/2010/main" w="9525">
                     <a:solidFill>
                       <a:srgbClr val="000000"/>
                     </a:solidFill>
@@ -10248,7 +10255,7 @@
               </a:ln>
               <a:extLst>
                 <a:ext uri="{91240B29-F687-4f45-9708-019B960494DF}">
-                  <a14:hiddenLine xmlns:a14="http://schemas.microsoft.com/office/drawing/2010/main" xmlns="" w="9525">
+                  <a14:hiddenLine xmlns="" xmlns:a14="http://schemas.microsoft.com/office/drawing/2010/main" w="9525">
                     <a:solidFill>
                       <a:srgbClr val="000000"/>
                     </a:solidFill>
@@ -10282,7 +10289,7 @@
               </a:ln>
               <a:extLst>
                 <a:ext uri="{91240B29-F687-4f45-9708-019B960494DF}">
-                  <a14:hiddenLine xmlns:a14="http://schemas.microsoft.com/office/drawing/2010/main" xmlns="" w="9525">
+                  <a14:hiddenLine xmlns="" xmlns:a14="http://schemas.microsoft.com/office/drawing/2010/main" w="9525">
                     <a:solidFill>
                       <a:srgbClr val="000000"/>
                     </a:solidFill>
@@ -10347,7 +10354,7 @@
               </a:ln>
               <a:extLst>
                 <a:ext uri="{91240B29-F687-4f45-9708-019B960494DF}">
-                  <a14:hiddenLine xmlns:a14="http://schemas.microsoft.com/office/drawing/2010/main" xmlns="" w="9525">
+                  <a14:hiddenLine xmlns="" xmlns:a14="http://schemas.microsoft.com/office/drawing/2010/main" w="9525">
                     <a:solidFill>
                       <a:srgbClr val="000000"/>
                     </a:solidFill>
@@ -10437,7 +10444,7 @@
               </a:ln>
               <a:extLst>
                 <a:ext uri="{91240B29-F687-4f45-9708-019B960494DF}">
-                  <a14:hiddenLine xmlns:a14="http://schemas.microsoft.com/office/drawing/2010/main" xmlns="" w="9525">
+                  <a14:hiddenLine xmlns="" xmlns:a14="http://schemas.microsoft.com/office/drawing/2010/main" w="9525">
                     <a:solidFill>
                       <a:srgbClr val="000000"/>
                     </a:solidFill>
@@ -10499,7 +10506,7 @@
               </a:ln>
               <a:extLst>
                 <a:ext uri="{91240B29-F687-4f45-9708-019B960494DF}">
-                  <a14:hiddenLine xmlns:a14="http://schemas.microsoft.com/office/drawing/2010/main" xmlns="" w="9525">
+                  <a14:hiddenLine xmlns="" xmlns:a14="http://schemas.microsoft.com/office/drawing/2010/main" w="9525">
                     <a:solidFill>
                       <a:srgbClr val="000000"/>
                     </a:solidFill>
@@ -10589,7 +10596,7 @@
               </a:ln>
               <a:extLst>
                 <a:ext uri="{91240B29-F687-4f45-9708-019B960494DF}">
-                  <a14:hiddenLine xmlns:a14="http://schemas.microsoft.com/office/drawing/2010/main" xmlns="" w="9525">
+                  <a14:hiddenLine xmlns="" xmlns:a14="http://schemas.microsoft.com/office/drawing/2010/main" w="9525">
                     <a:solidFill>
                       <a:srgbClr val="000000"/>
                     </a:solidFill>
@@ -10654,7 +10661,7 @@
               </a:ln>
               <a:extLst>
                 <a:ext uri="{91240B29-F687-4f45-9708-019B960494DF}">
-                  <a14:hiddenLine xmlns:a14="http://schemas.microsoft.com/office/drawing/2010/main" xmlns="" w="9525">
+                  <a14:hiddenLine xmlns="" xmlns:a14="http://schemas.microsoft.com/office/drawing/2010/main" w="9525">
                     <a:solidFill>
                       <a:srgbClr val="000000"/>
                     </a:solidFill>
@@ -10716,7 +10723,7 @@
               </a:ln>
               <a:extLst>
                 <a:ext uri="{91240B29-F687-4f45-9708-019B960494DF}">
-                  <a14:hiddenLine xmlns:a14="http://schemas.microsoft.com/office/drawing/2010/main" xmlns="" w="9525">
+                  <a14:hiddenLine xmlns="" xmlns:a14="http://schemas.microsoft.com/office/drawing/2010/main" w="9525">
                     <a:solidFill>
                       <a:srgbClr val="000000"/>
                     </a:solidFill>
@@ -10806,7 +10813,7 @@
               </a:ln>
               <a:extLst>
                 <a:ext uri="{91240B29-F687-4f45-9708-019B960494DF}">
-                  <a14:hiddenLine xmlns:a14="http://schemas.microsoft.com/office/drawing/2010/main" xmlns="" w="9525">
+                  <a14:hiddenLine xmlns="" xmlns:a14="http://schemas.microsoft.com/office/drawing/2010/main" w="9525">
                     <a:solidFill>
                       <a:srgbClr val="000000"/>
                     </a:solidFill>
@@ -10896,7 +10903,7 @@
               </a:ln>
               <a:extLst>
                 <a:ext uri="{91240B29-F687-4f45-9708-019B960494DF}">
-                  <a14:hiddenLine xmlns:a14="http://schemas.microsoft.com/office/drawing/2010/main" xmlns="" w="9525">
+                  <a14:hiddenLine xmlns="" xmlns:a14="http://schemas.microsoft.com/office/drawing/2010/main" w="9525">
                     <a:solidFill>
                       <a:srgbClr val="000000"/>
                     </a:solidFill>
@@ -10961,7 +10968,7 @@
               </a:ln>
               <a:extLst>
                 <a:ext uri="{91240B29-F687-4f45-9708-019B960494DF}">
-                  <a14:hiddenLine xmlns:a14="http://schemas.microsoft.com/office/drawing/2010/main" xmlns="" w="9525">
+                  <a14:hiddenLine xmlns="" xmlns:a14="http://schemas.microsoft.com/office/drawing/2010/main" w="9525">
                     <a:solidFill>
                       <a:srgbClr val="000000"/>
                     </a:solidFill>
@@ -11081,7 +11088,7 @@
               </a:ln>
               <a:extLst>
                 <a:ext uri="{91240B29-F687-4f45-9708-019B960494DF}">
-                  <a14:hiddenLine xmlns:a14="http://schemas.microsoft.com/office/drawing/2010/main" xmlns="" w="9525">
+                  <a14:hiddenLine xmlns="" xmlns:a14="http://schemas.microsoft.com/office/drawing/2010/main" w="9525">
                     <a:solidFill>
                       <a:srgbClr val="000000"/>
                     </a:solidFill>
@@ -11162,7 +11169,7 @@
               </a:ln>
               <a:extLst>
                 <a:ext uri="{91240B29-F687-4f45-9708-019B960494DF}">
-                  <a14:hiddenLine xmlns:a14="http://schemas.microsoft.com/office/drawing/2010/main" xmlns="" w="9525">
+                  <a14:hiddenLine xmlns="" xmlns:a14="http://schemas.microsoft.com/office/drawing/2010/main" w="9525">
                     <a:solidFill>
                       <a:srgbClr val="000000"/>
                     </a:solidFill>
@@ -11277,7 +11284,7 @@
               </a:ln>
               <a:extLst>
                 <a:ext uri="{91240B29-F687-4f45-9708-019B960494DF}">
-                  <a14:hiddenLine xmlns:a14="http://schemas.microsoft.com/office/drawing/2010/main" xmlns="" w="9525">
+                  <a14:hiddenLine xmlns="" xmlns:a14="http://schemas.microsoft.com/office/drawing/2010/main" w="9525">
                     <a:solidFill>
                       <a:srgbClr val="000000"/>
                     </a:solidFill>
@@ -11367,7 +11374,7 @@
               </a:ln>
               <a:extLst>
                 <a:ext uri="{91240B29-F687-4f45-9708-019B960494DF}">
-                  <a14:hiddenLine xmlns:a14="http://schemas.microsoft.com/office/drawing/2010/main" xmlns="" w="9525">
+                  <a14:hiddenLine xmlns="" xmlns:a14="http://schemas.microsoft.com/office/drawing/2010/main" w="9525">
                     <a:solidFill>
                       <a:srgbClr val="000000"/>
                     </a:solidFill>
@@ -11432,7 +11439,7 @@
               </a:ln>
               <a:extLst>
                 <a:ext uri="{91240B29-F687-4f45-9708-019B960494DF}">
-                  <a14:hiddenLine xmlns:a14="http://schemas.microsoft.com/office/drawing/2010/main" xmlns="" w="9525">
+                  <a14:hiddenLine xmlns="" xmlns:a14="http://schemas.microsoft.com/office/drawing/2010/main" w="9525">
                     <a:solidFill>
                       <a:srgbClr val="000000"/>
                     </a:solidFill>
@@ -11522,7 +11529,7 @@
               </a:ln>
               <a:extLst>
                 <a:ext uri="{91240B29-F687-4f45-9708-019B960494DF}">
-                  <a14:hiddenLine xmlns:a14="http://schemas.microsoft.com/office/drawing/2010/main" xmlns="" w="9525">
+                  <a14:hiddenLine xmlns="" xmlns:a14="http://schemas.microsoft.com/office/drawing/2010/main" w="9525">
                     <a:solidFill>
                       <a:srgbClr val="000000"/>
                     </a:solidFill>
@@ -11590,7 +11597,7 @@
               </a:ln>
               <a:extLst>
                 <a:ext uri="{91240B29-F687-4f45-9708-019B960494DF}">
-                  <a14:hiddenLine xmlns:a14="http://schemas.microsoft.com/office/drawing/2010/main" xmlns="" w="9525">
+                  <a14:hiddenLine xmlns="" xmlns:a14="http://schemas.microsoft.com/office/drawing/2010/main" w="9525">
                     <a:solidFill>
                       <a:srgbClr val="000000"/>
                     </a:solidFill>
@@ -11680,7 +11687,7 @@
               </a:ln>
               <a:extLst>
                 <a:ext uri="{91240B29-F687-4f45-9708-019B960494DF}">
-                  <a14:hiddenLine xmlns:a14="http://schemas.microsoft.com/office/drawing/2010/main" xmlns="" w="9525">
+                  <a14:hiddenLine xmlns="" xmlns:a14="http://schemas.microsoft.com/office/drawing/2010/main" w="9525">
                     <a:solidFill>
                       <a:srgbClr val="000000"/>
                     </a:solidFill>
@@ -11748,7 +11755,7 @@
               </a:ln>
               <a:extLst>
                 <a:ext uri="{91240B29-F687-4f45-9708-019B960494DF}">
-                  <a14:hiddenLine xmlns:a14="http://schemas.microsoft.com/office/drawing/2010/main" xmlns="" w="9525">
+                  <a14:hiddenLine xmlns="" xmlns:a14="http://schemas.microsoft.com/office/drawing/2010/main" w="9525">
                     <a:solidFill>
                       <a:srgbClr val="000000"/>
                     </a:solidFill>
@@ -11838,7 +11845,7 @@
               </a:ln>
               <a:extLst>
                 <a:ext uri="{91240B29-F687-4f45-9708-019B960494DF}">
-                  <a14:hiddenLine xmlns:a14="http://schemas.microsoft.com/office/drawing/2010/main" xmlns="" w="9525">
+                  <a14:hiddenLine xmlns="" xmlns:a14="http://schemas.microsoft.com/office/drawing/2010/main" w="9525">
                     <a:solidFill>
                       <a:srgbClr val="000000"/>
                     </a:solidFill>
@@ -11872,7 +11879,7 @@
               </a:ln>
               <a:extLst>
                 <a:ext uri="{91240B29-F687-4f45-9708-019B960494DF}">
-                  <a14:hiddenLine xmlns:a14="http://schemas.microsoft.com/office/drawing/2010/main" xmlns="" w="9525">
+                  <a14:hiddenLine xmlns="" xmlns:a14="http://schemas.microsoft.com/office/drawing/2010/main" w="9525">
                     <a:solidFill>
                       <a:srgbClr val="000000"/>
                     </a:solidFill>
@@ -12012,7 +12019,7 @@
           <a:p>
             <a:fld id="{34506231-73E2-D044-86C2-B0CD50441F1B}" type="datetimeFigureOut">
               <a:rPr lang="en-US" smtClean="0"/>
-              <a:t>1/14/19</a:t>
+              <a:t>1/28/19</a:t>
             </a:fld>
             <a:endParaRPr lang="en-US" dirty="0"/>
           </a:p>
@@ -12626,6 +12633,262 @@
           <p:cNvPr id="2" name="Title 1">
             <a:extLst>
               <a:ext uri="{FF2B5EF4-FFF2-40B4-BE49-F238E27FC236}">
+                <a16:creationId xmlns:a16="http://schemas.microsoft.com/office/drawing/2014/main" id="{E5B12A03-1FD3-8A43-85CD-9A8CD1A73FB6}"/>
+              </a:ext>
+            </a:extLst>
+          </p:cNvPr>
+          <p:cNvSpPr>
+            <a:spLocks noGrp="1"/>
+          </p:cNvSpPr>
+          <p:nvPr>
+            <p:ph type="title"/>
+          </p:nvPr>
+        </p:nvSpPr>
+        <p:spPr/>
+        <p:txBody>
+          <a:bodyPr>
+            <a:normAutofit/>
+          </a:bodyPr>
+          <a:lstStyle/>
+          <a:p>
+            <a:r>
+              <a:rPr lang="en-US" sz="4400" dirty="0"/>
+              <a:t>Simulation</a:t>
+            </a:r>
+          </a:p>
+        </p:txBody>
+      </p:sp>
+      <p:sp>
+        <p:nvSpPr>
+          <p:cNvPr id="3" name="Content Placeholder 2">
+            <a:extLst>
+              <a:ext uri="{FF2B5EF4-FFF2-40B4-BE49-F238E27FC236}">
+                <a16:creationId xmlns:a16="http://schemas.microsoft.com/office/drawing/2014/main" id="{2D7BEEA7-B316-814C-90D8-E7FCA737EFFE}"/>
+              </a:ext>
+            </a:extLst>
+          </p:cNvPr>
+          <p:cNvSpPr>
+            <a:spLocks noGrp="1"/>
+          </p:cNvSpPr>
+          <p:nvPr>
+            <p:ph idx="1"/>
+          </p:nvPr>
+        </p:nvSpPr>
+        <p:spPr>
+          <a:xfrm>
+            <a:off x="531811" y="1795144"/>
+            <a:ext cx="10515600" cy="4807187"/>
+          </a:xfrm>
+        </p:spPr>
+        <p:txBody>
+          <a:bodyPr>
+            <a:normAutofit lnSpcReduction="10000"/>
+          </a:bodyPr>
+          <a:lstStyle/>
+          <a:p>
+            <a:r>
+              <a:rPr lang="en-US" dirty="0"/>
+              <a:t>Software to allow simulation of assets and their movements. </a:t>
+            </a:r>
+          </a:p>
+          <a:p>
+            <a:r>
+              <a:rPr lang="en-US" dirty="0"/>
+              <a:t>Variables:</a:t>
+            </a:r>
+          </a:p>
+          <a:p>
+            <a:pPr lvl="1"/>
+            <a:r>
+              <a:rPr lang="en-US" dirty="0"/>
+              <a:t>Number of assets and ratio of smart:dumb</a:t>
+            </a:r>
+          </a:p>
+          <a:p>
+            <a:pPr lvl="1"/>
+            <a:r>
+              <a:rPr lang="en-US" dirty="0"/>
+              <a:t>Rate of change of location of assets</a:t>
+            </a:r>
+          </a:p>
+          <a:p>
+            <a:pPr lvl="1"/>
+            <a:r>
+              <a:rPr lang="en-US" dirty="0"/>
+              <a:t>Noisy data</a:t>
+            </a:r>
+          </a:p>
+          <a:p>
+            <a:pPr lvl="1"/>
+            <a:r>
+              <a:rPr lang="en-US" dirty="0"/>
+              <a:t>Accuracy of GPS</a:t>
+            </a:r>
+          </a:p>
+          <a:p>
+            <a:pPr lvl="1"/>
+            <a:r>
+              <a:rPr lang="en-US" dirty="0"/>
+              <a:t>Burstiness of asset uploads</a:t>
+            </a:r>
+          </a:p>
+          <a:p>
+            <a:r>
+              <a:rPr lang="en-US" dirty="0"/>
+              <a:t>Possible software:</a:t>
+            </a:r>
+          </a:p>
+          <a:p>
+            <a:pPr lvl="1"/>
+            <a:r>
+              <a:rPr lang="en-US" dirty="0"/>
+              <a:t>GAMMA (</a:t>
+            </a:r>
+            <a:r>
+              <a:rPr lang="en-US" dirty="0">
+                <a:hlinkClick r:id="rId3"/>
+              </a:rPr>
+              <a:t>https://gama-platform.github.io/</a:t>
+            </a:r>
+            <a:r>
+              <a:rPr lang="en-US" dirty="0"/>
+              <a:t>)</a:t>
+            </a:r>
+          </a:p>
+          <a:p>
+            <a:pPr lvl="1"/>
+            <a:r>
+              <a:rPr lang="en-US" dirty="0"/>
+              <a:t>AnyLogic (</a:t>
+            </a:r>
+            <a:r>
+              <a:rPr lang="en-US" dirty="0">
+                <a:hlinkClick r:id="rId4"/>
+              </a:rPr>
+              <a:t>https://www.anylogic.com/transportation/</a:t>
+            </a:r>
+            <a:r>
+              <a:rPr lang="en-US" dirty="0"/>
+              <a:t>)</a:t>
+            </a:r>
+          </a:p>
+          <a:p>
+            <a:pPr lvl="1"/>
+            <a:r>
+              <a:rPr lang="en-US" dirty="0"/>
+              <a:t>Brinkhoff Generator</a:t>
+            </a:r>
+          </a:p>
+          <a:p>
+            <a:pPr lvl="1"/>
+            <a:endParaRPr lang="en-US" dirty="0"/>
+          </a:p>
+          <a:p>
+            <a:pPr lvl="1"/>
+            <a:endParaRPr lang="en-US" dirty="0"/>
+          </a:p>
+          <a:p>
+            <a:pPr marL="0" indent="0">
+              <a:buNone/>
+            </a:pPr>
+            <a:endParaRPr lang="en-US" dirty="0"/>
+          </a:p>
+        </p:txBody>
+      </p:sp>
+      <p:pic>
+        <p:nvPicPr>
+          <p:cNvPr id="6" name="Picture 5">
+            <a:extLst>
+              <a:ext uri="{FF2B5EF4-FFF2-40B4-BE49-F238E27FC236}">
+                <a16:creationId xmlns:a16="http://schemas.microsoft.com/office/drawing/2014/main" id="{2B545DE0-6A24-244D-BB21-5CA0EF5848C0}"/>
+              </a:ext>
+            </a:extLst>
+          </p:cNvPr>
+          <p:cNvPicPr>
+            <a:picLocks noChangeAspect="1"/>
+          </p:cNvPicPr>
+          <p:nvPr/>
+        </p:nvPicPr>
+        <p:blipFill>
+          <a:blip r:embed="rId5"/>
+          <a:stretch>
+            <a:fillRect/>
+          </a:stretch>
+        </p:blipFill>
+        <p:spPr>
+          <a:xfrm>
+            <a:off x="5789611" y="2697480"/>
+            <a:ext cx="6296054" cy="2804277"/>
+          </a:xfrm>
+          <a:prstGeom prst="rect">
+            <a:avLst/>
+          </a:prstGeom>
+        </p:spPr>
+      </p:pic>
+    </p:spTree>
+    <p:extLst>
+      <p:ext uri="{BB962C8B-B14F-4D97-AF65-F5344CB8AC3E}">
+        <p14:creationId xmlns:p14="http://schemas.microsoft.com/office/powerpoint/2010/main" val="4112873"/>
+      </p:ext>
+    </p:extLst>
+  </p:cSld>
+  <p:clrMapOvr>
+    <a:masterClrMapping/>
+  </p:clrMapOvr>
+</p:sld>
+</file>
+
+<file path=ppt/slides/slide11.xml><?xml version="1.0" encoding="utf-8"?>
+<p:sld xmlns:a="http://schemas.openxmlformats.org/drawingml/2006/main" xmlns:r="http://schemas.openxmlformats.org/officeDocument/2006/relationships" xmlns:p="http://schemas.openxmlformats.org/presentationml/2006/main">
+  <p:cSld>
+    <p:bg>
+      <p:bgPr>
+        <a:blipFill dpi="0" rotWithShape="1">
+          <a:blip r:embed="rId2">
+            <a:alphaModFix amt="59000"/>
+            <a:duotone>
+              <a:schemeClr val="bg2">
+                <a:shade val="88000"/>
+                <a:hueMod val="106000"/>
+                <a:satMod val="140000"/>
+                <a:lumMod val="54000"/>
+              </a:schemeClr>
+              <a:schemeClr val="bg2">
+                <a:tint val="98000"/>
+                <a:hueMod val="90000"/>
+                <a:satMod val="150000"/>
+                <a:lumMod val="160000"/>
+              </a:schemeClr>
+            </a:duotone>
+            <a:lum/>
+          </a:blip>
+          <a:srcRect/>
+          <a:stretch>
+            <a:fillRect/>
+          </a:stretch>
+        </a:blipFill>
+        <a:effectLst/>
+      </p:bgPr>
+    </p:bg>
+    <p:spTree>
+      <p:nvGrpSpPr>
+        <p:cNvPr id="1" name=""/>
+        <p:cNvGrpSpPr/>
+        <p:nvPr/>
+      </p:nvGrpSpPr>
+      <p:grpSpPr>
+        <a:xfrm>
+          <a:off x="0" y="0"/>
+          <a:ext cx="0" cy="0"/>
+          <a:chOff x="0" y="0"/>
+          <a:chExt cx="0" cy="0"/>
+        </a:xfrm>
+      </p:grpSpPr>
+      <p:sp>
+        <p:nvSpPr>
+          <p:cNvPr id="2" name="Title 1">
+            <a:extLst>
+              <a:ext uri="{FF2B5EF4-FFF2-40B4-BE49-F238E27FC236}">
                 <a16:creationId xmlns:a16="http://schemas.microsoft.com/office/drawing/2014/main" id="{B7BAF366-897F-E044-9F25-3D262DDFD177}"/>
               </a:ext>
             </a:extLst>
@@ -12639,11 +12902,13 @@
         </p:nvSpPr>
         <p:spPr/>
         <p:txBody>
-          <a:bodyPr/>
+          <a:bodyPr>
+            <a:normAutofit/>
+          </a:bodyPr>
           <a:lstStyle/>
           <a:p>
             <a:r>
-              <a:rPr lang="en-US" dirty="0"/>
+              <a:rPr lang="en-US" sz="4400" dirty="0"/>
               <a:t>Experimentation</a:t>
             </a:r>
           </a:p>
@@ -12720,7 +12985,7 @@
 </p:sld>
 </file>
 
-<file path=ppt/slides/slide11.xml><?xml version="1.0" encoding="utf-8"?>
+<file path=ppt/slides/slide12.xml><?xml version="1.0" encoding="utf-8"?>
 <p:sld xmlns:a="http://schemas.openxmlformats.org/drawingml/2006/main" xmlns:r="http://schemas.openxmlformats.org/officeDocument/2006/relationships" xmlns:p="http://schemas.openxmlformats.org/presentationml/2006/main">
   <p:cSld>
     <p:bg>
@@ -12784,11 +13049,13 @@
         </p:nvSpPr>
         <p:spPr/>
         <p:txBody>
-          <a:bodyPr/>
+          <a:bodyPr>
+            <a:normAutofit/>
+          </a:bodyPr>
           <a:lstStyle/>
           <a:p>
             <a:r>
-              <a:rPr lang="en-US" dirty="0"/>
+              <a:rPr lang="en-US" sz="4400" dirty="0"/>
               <a:t>User Interface</a:t>
             </a:r>
           </a:p>
@@ -12903,6 +13170,94 @@
 </p:sld>
 </file>
 
+<file path=ppt/slides/slide13.xml><?xml version="1.0" encoding="utf-8"?>
+<p:sld xmlns:a="http://schemas.openxmlformats.org/drawingml/2006/main" xmlns:r="http://schemas.openxmlformats.org/officeDocument/2006/relationships" xmlns:p="http://schemas.openxmlformats.org/presentationml/2006/main" showMasterSp="0">
+  <p:cSld>
+    <p:bg>
+      <p:bgPr>
+        <a:solidFill>
+          <a:schemeClr val="bg1"/>
+        </a:solidFill>
+        <a:effectLst/>
+      </p:bgPr>
+    </p:bg>
+    <p:spTree>
+      <p:nvGrpSpPr>
+        <p:cNvPr id="1" name=""/>
+        <p:cNvGrpSpPr/>
+        <p:nvPr/>
+      </p:nvGrpSpPr>
+      <p:grpSpPr>
+        <a:xfrm>
+          <a:off x="0" y="0"/>
+          <a:ext cx="0" cy="0"/>
+          <a:chOff x="0" y="0"/>
+          <a:chExt cx="0" cy="0"/>
+        </a:xfrm>
+      </p:grpSpPr>
+      <p:sp>
+        <p:nvSpPr>
+          <p:cNvPr id="2" name="Title 1">
+            <a:extLst>
+              <a:ext uri="{FF2B5EF4-FFF2-40B4-BE49-F238E27FC236}">
+                <a16:creationId xmlns:a16="http://schemas.microsoft.com/office/drawing/2014/main" id="{83700D18-9718-934E-BC98-053787224AD2}"/>
+              </a:ext>
+            </a:extLst>
+          </p:cNvPr>
+          <p:cNvSpPr>
+            <a:spLocks noGrp="1"/>
+          </p:cNvSpPr>
+          <p:nvPr>
+            <p:ph type="title"/>
+          </p:nvPr>
+        </p:nvSpPr>
+        <p:spPr/>
+        <p:txBody>
+          <a:bodyPr/>
+          <a:lstStyle/>
+          <a:p>
+            <a:endParaRPr lang="en-US"/>
+          </a:p>
+        </p:txBody>
+      </p:sp>
+      <p:sp>
+        <p:nvSpPr>
+          <p:cNvPr id="3" name="Content Placeholder 2">
+            <a:extLst>
+              <a:ext uri="{FF2B5EF4-FFF2-40B4-BE49-F238E27FC236}">
+                <a16:creationId xmlns:a16="http://schemas.microsoft.com/office/drawing/2014/main" id="{58D696B2-5578-E84E-93A9-11E89A228F3F}"/>
+              </a:ext>
+            </a:extLst>
+          </p:cNvPr>
+          <p:cNvSpPr>
+            <a:spLocks noGrp="1"/>
+          </p:cNvSpPr>
+          <p:nvPr>
+            <p:ph idx="1"/>
+          </p:nvPr>
+        </p:nvSpPr>
+        <p:spPr/>
+        <p:txBody>
+          <a:bodyPr/>
+          <a:lstStyle/>
+          <a:p>
+            <a:endParaRPr lang="en-US"/>
+          </a:p>
+        </p:txBody>
+      </p:sp>
+    </p:spTree>
+    <p:extLst>
+      <p:ext uri="{BB962C8B-B14F-4D97-AF65-F5344CB8AC3E}">
+        <p14:creationId xmlns:p14="http://schemas.microsoft.com/office/powerpoint/2010/main" val="3492819013"/>
+      </p:ext>
+    </p:extLst>
+  </p:cSld>
+  <p:clrMapOvr>
+    <a:masterClrMapping/>
+  </p:clrMapOvr>
+</p:sld>
+</file>
+
 <file path=ppt/slides/slide2.xml><?xml version="1.0" encoding="utf-8"?>
 <p:sld xmlns:a="http://schemas.openxmlformats.org/drawingml/2006/main" xmlns:r="http://schemas.openxmlformats.org/officeDocument/2006/relationships" xmlns:p="http://schemas.openxmlformats.org/presentationml/2006/main">
   <p:cSld>
@@ -12967,11 +13322,13 @@
         </p:nvSpPr>
         <p:spPr/>
         <p:txBody>
-          <a:bodyPr/>
+          <a:bodyPr>
+            <a:normAutofit/>
+          </a:bodyPr>
           <a:lstStyle/>
           <a:p>
             <a:r>
-              <a:rPr lang="en-US" dirty="0"/>
+              <a:rPr lang="en-US" sz="4400" dirty="0"/>
               <a:t>Today’s Objectives</a:t>
             </a:r>
           </a:p>
@@ -13001,19 +13358,19 @@
           <a:lstStyle/>
           <a:p>
             <a:r>
-              <a:rPr lang="en-US" dirty="0"/>
+              <a:rPr lang="en-US" sz="3200" dirty="0"/>
               <a:t>Chosen Solution</a:t>
             </a:r>
           </a:p>
           <a:p>
             <a:r>
-              <a:rPr lang="en-US" dirty="0"/>
+              <a:rPr lang="en-US" sz="3200" dirty="0"/>
               <a:t>Progress so far</a:t>
             </a:r>
           </a:p>
           <a:p>
             <a:r>
-              <a:rPr lang="en-US" dirty="0"/>
+              <a:rPr lang="en-US" sz="3200" dirty="0"/>
               <a:t>Remaining work</a:t>
             </a:r>
           </a:p>
@@ -13094,13 +13451,20 @@
             <p:ph type="title"/>
           </p:nvPr>
         </p:nvSpPr>
-        <p:spPr/>
+        <p:spPr>
+          <a:xfrm>
+            <a:off x="851853" y="222278"/>
+            <a:ext cx="9905998" cy="1478570"/>
+          </a:xfrm>
+        </p:spPr>
         <p:txBody>
-          <a:bodyPr/>
+          <a:bodyPr>
+            <a:normAutofit/>
+          </a:bodyPr>
           <a:lstStyle/>
           <a:p>
             <a:r>
-              <a:rPr lang="en-US" dirty="0"/>
+              <a:rPr lang="en-US" sz="4400" dirty="0"/>
               <a:t>Overall Solution</a:t>
             </a:r>
           </a:p>
@@ -13108,10 +13472,10 @@
       </p:sp>
       <p:pic>
         <p:nvPicPr>
-          <p:cNvPr id="10" name="Picture 9">
+          <p:cNvPr id="4" name="Picture 3">
             <a:extLst>
               <a:ext uri="{FF2B5EF4-FFF2-40B4-BE49-F238E27FC236}">
-                <a16:creationId xmlns:a16="http://schemas.microsoft.com/office/drawing/2014/main" id="{52127014-E041-034F-BAEC-523213CCE517}"/>
+                <a16:creationId xmlns:a16="http://schemas.microsoft.com/office/drawing/2014/main" id="{83318395-6457-5E45-932F-D3B50EB4C565}"/>
               </a:ext>
             </a:extLst>
           </p:cNvPr>
@@ -13128,8 +13492,8 @@
         </p:blipFill>
         <p:spPr>
           <a:xfrm>
-            <a:off x="1396051" y="1992573"/>
-            <a:ext cx="9399898" cy="3600639"/>
+            <a:off x="3489959" y="694718"/>
+            <a:ext cx="7833361" cy="6752897"/>
           </a:xfrm>
           <a:prstGeom prst="rect">
             <a:avLst/>
@@ -13200,6 +13564,125 @@
           <p:cNvPr id="2" name="Title 1">
             <a:extLst>
               <a:ext uri="{FF2B5EF4-FFF2-40B4-BE49-F238E27FC236}">
+                <a16:creationId xmlns:a16="http://schemas.microsoft.com/office/drawing/2014/main" id="{488FE375-CC08-A248-8281-4897F158A201}"/>
+              </a:ext>
+            </a:extLst>
+          </p:cNvPr>
+          <p:cNvSpPr>
+            <a:spLocks noGrp="1"/>
+          </p:cNvSpPr>
+          <p:nvPr>
+            <p:ph type="title"/>
+          </p:nvPr>
+        </p:nvSpPr>
+        <p:spPr/>
+        <p:txBody>
+          <a:bodyPr>
+            <a:normAutofit/>
+          </a:bodyPr>
+          <a:lstStyle/>
+          <a:p>
+            <a:r>
+              <a:rPr lang="en-US" sz="4400" dirty="0"/>
+              <a:t>Overall Solution</a:t>
+            </a:r>
+          </a:p>
+        </p:txBody>
+      </p:sp>
+      <p:pic>
+        <p:nvPicPr>
+          <p:cNvPr id="10" name="Picture 9">
+            <a:extLst>
+              <a:ext uri="{FF2B5EF4-FFF2-40B4-BE49-F238E27FC236}">
+                <a16:creationId xmlns:a16="http://schemas.microsoft.com/office/drawing/2014/main" id="{52127014-E041-034F-BAEC-523213CCE517}"/>
+              </a:ext>
+            </a:extLst>
+          </p:cNvPr>
+          <p:cNvPicPr>
+            <a:picLocks noChangeAspect="1"/>
+          </p:cNvPicPr>
+          <p:nvPr/>
+        </p:nvPicPr>
+        <p:blipFill>
+          <a:blip r:embed="rId3"/>
+          <a:stretch>
+            <a:fillRect/>
+          </a:stretch>
+        </p:blipFill>
+        <p:spPr>
+          <a:xfrm>
+            <a:off x="1396051" y="1992573"/>
+            <a:ext cx="9399898" cy="3600639"/>
+          </a:xfrm>
+          <a:prstGeom prst="rect">
+            <a:avLst/>
+          </a:prstGeom>
+        </p:spPr>
+      </p:pic>
+    </p:spTree>
+    <p:extLst>
+      <p:ext uri="{BB962C8B-B14F-4D97-AF65-F5344CB8AC3E}">
+        <p14:creationId xmlns:p14="http://schemas.microsoft.com/office/powerpoint/2010/main" val="2098428767"/>
+      </p:ext>
+    </p:extLst>
+  </p:cSld>
+  <p:clrMapOvr>
+    <a:masterClrMapping/>
+  </p:clrMapOvr>
+</p:sld>
+</file>
+
+<file path=ppt/slides/slide5.xml><?xml version="1.0" encoding="utf-8"?>
+<p:sld xmlns:a="http://schemas.openxmlformats.org/drawingml/2006/main" xmlns:r="http://schemas.openxmlformats.org/officeDocument/2006/relationships" xmlns:p="http://schemas.openxmlformats.org/presentationml/2006/main">
+  <p:cSld>
+    <p:bg>
+      <p:bgPr>
+        <a:blipFill dpi="0" rotWithShape="1">
+          <a:blip r:embed="rId2">
+            <a:alphaModFix amt="59000"/>
+            <a:duotone>
+              <a:schemeClr val="bg2">
+                <a:shade val="88000"/>
+                <a:hueMod val="106000"/>
+                <a:satMod val="140000"/>
+                <a:lumMod val="54000"/>
+              </a:schemeClr>
+              <a:schemeClr val="bg2">
+                <a:tint val="98000"/>
+                <a:hueMod val="90000"/>
+                <a:satMod val="150000"/>
+                <a:lumMod val="160000"/>
+              </a:schemeClr>
+            </a:duotone>
+            <a:lum/>
+          </a:blip>
+          <a:srcRect/>
+          <a:stretch>
+            <a:fillRect/>
+          </a:stretch>
+        </a:blipFill>
+        <a:effectLst/>
+      </p:bgPr>
+    </p:bg>
+    <p:spTree>
+      <p:nvGrpSpPr>
+        <p:cNvPr id="1" name=""/>
+        <p:cNvGrpSpPr/>
+        <p:nvPr/>
+      </p:nvGrpSpPr>
+      <p:grpSpPr>
+        <a:xfrm>
+          <a:off x="0" y="0"/>
+          <a:ext cx="0" cy="0"/>
+          <a:chOff x="0" y="0"/>
+          <a:chExt cx="0" cy="0"/>
+        </a:xfrm>
+      </p:grpSpPr>
+      <p:sp>
+        <p:nvSpPr>
+          <p:cNvPr id="2" name="Title 1">
+            <a:extLst>
+              <a:ext uri="{FF2B5EF4-FFF2-40B4-BE49-F238E27FC236}">
                 <a16:creationId xmlns:a16="http://schemas.microsoft.com/office/drawing/2014/main" id="{427E36C9-C536-6244-8B4C-7B423DBDB568}"/>
               </a:ext>
             </a:extLst>
@@ -13213,16 +13696,18 @@
         </p:nvSpPr>
         <p:spPr>
           <a:xfrm>
-            <a:off x="1097508" y="268496"/>
+            <a:off x="351069" y="166896"/>
             <a:ext cx="10515600" cy="1325563"/>
           </a:xfrm>
         </p:spPr>
         <p:txBody>
-          <a:bodyPr/>
+          <a:bodyPr>
+            <a:normAutofit/>
+          </a:bodyPr>
           <a:lstStyle/>
           <a:p>
             <a:r>
-              <a:rPr lang="en-US" dirty="0"/>
+              <a:rPr lang="en-US" sz="4400" dirty="0"/>
               <a:t>Planned Implementation</a:t>
             </a:r>
           </a:p>
@@ -13252,8 +13737,8 @@
         </p:blipFill>
         <p:spPr>
           <a:xfrm>
-            <a:off x="6706860" y="1119116"/>
-            <a:ext cx="3994650" cy="4622740"/>
+            <a:off x="6865730" y="694267"/>
+            <a:ext cx="5326269" cy="6163734"/>
           </a:xfrm>
         </p:spPr>
       </p:pic>
@@ -13271,8 +13756,8 @@
         </p:nvSpPr>
         <p:spPr>
           <a:xfrm>
-            <a:off x="672802" y="2506971"/>
-            <a:ext cx="5791201" cy="2308324"/>
+            <a:off x="351069" y="1906992"/>
+            <a:ext cx="6100531" cy="3046988"/>
           </a:xfrm>
           <a:prstGeom prst="rect">
             <a:avLst/>
@@ -13290,7 +13775,7 @@
               <a:buChar char="•"/>
             </a:pPr>
             <a:r>
-              <a:rPr lang="en-US" dirty="0"/>
+              <a:rPr lang="en-US" sz="2400" dirty="0"/>
               <a:t>”Dumb Asset” refers to simple BLE Beacon</a:t>
             </a:r>
           </a:p>
@@ -13300,7 +13785,7 @@
               <a:buChar char="•"/>
             </a:pPr>
             <a:r>
-              <a:rPr lang="en-US" dirty="0"/>
+              <a:rPr lang="en-US" sz="2400" dirty="0"/>
               <a:t>“Smart Asset” refers to a Raspberry Pi with BLE, WiFi and GPS. </a:t>
             </a:r>
           </a:p>
@@ -13310,7 +13795,7 @@
               <a:buChar char="•"/>
             </a:pPr>
             <a:r>
-              <a:rPr lang="en-US" dirty="0"/>
+              <a:rPr lang="en-US" sz="2400" dirty="0"/>
               <a:t>‘Serverless’ cloud computing hosted on Amazon Web Services (AWS) </a:t>
             </a:r>
           </a:p>
@@ -13320,7 +13805,7 @@
               <a:buChar char="•"/>
             </a:pPr>
             <a:r>
-              <a:rPr lang="en-US" dirty="0"/>
+              <a:rPr lang="en-US" sz="2400" dirty="0"/>
               <a:t>“Operator Terminal” provides end user with UI to view data collected from assets and view system’s predictions for asset location</a:t>
             </a:r>
           </a:p>
@@ -13339,7 +13824,7 @@
 </p:sld>
 </file>
 
-<file path=ppt/slides/slide5.xml><?xml version="1.0" encoding="utf-8"?>
+<file path=ppt/slides/slide6.xml><?xml version="1.0" encoding="utf-8"?>
 <p:sld xmlns:a="http://schemas.openxmlformats.org/drawingml/2006/main" xmlns:r="http://schemas.openxmlformats.org/officeDocument/2006/relationships" xmlns:p="http://schemas.openxmlformats.org/presentationml/2006/main">
   <p:cSld>
     <p:bg>
@@ -13403,11 +13888,13 @@
         </p:nvSpPr>
         <p:spPr/>
         <p:txBody>
-          <a:bodyPr/>
+          <a:bodyPr>
+            <a:normAutofit/>
+          </a:bodyPr>
           <a:lstStyle/>
           <a:p>
             <a:r>
-              <a:rPr lang="en-US" dirty="0"/>
+              <a:rPr lang="en-US" sz="4400" dirty="0"/>
               <a:t>Cloud Architecture</a:t>
             </a:r>
           </a:p>
@@ -13606,7 +14093,7 @@
 </p:sld>
 </file>
 
-<file path=ppt/slides/slide6.xml><?xml version="1.0" encoding="utf-8"?>
+<file path=ppt/slides/slide7.xml><?xml version="1.0" encoding="utf-8"?>
 <p:sld xmlns:a="http://schemas.openxmlformats.org/drawingml/2006/main" xmlns:r="http://schemas.openxmlformats.org/officeDocument/2006/relationships" xmlns:p="http://schemas.openxmlformats.org/presentationml/2006/main">
   <p:cSld>
     <p:bg>
@@ -13701,11 +14188,13 @@
         </p:nvSpPr>
         <p:spPr/>
         <p:txBody>
-          <a:bodyPr/>
+          <a:bodyPr>
+            <a:normAutofit/>
+          </a:bodyPr>
           <a:lstStyle/>
           <a:p>
             <a:r>
-              <a:rPr lang="en-US" dirty="0"/>
+              <a:rPr lang="en-US" sz="4400" dirty="0"/>
               <a:t>Current System</a:t>
             </a:r>
           </a:p>
@@ -13755,8 +14244,8 @@
         </p:nvSpPr>
         <p:spPr>
           <a:xfrm>
-            <a:off x="873056" y="1775124"/>
-            <a:ext cx="3016912" cy="1200329"/>
+            <a:off x="894643" y="2067142"/>
+            <a:ext cx="3287889" cy="1323439"/>
           </a:xfrm>
           <a:prstGeom prst="rect">
             <a:avLst/>
@@ -13770,7 +14259,7 @@
           <a:lstStyle/>
           <a:p>
             <a:r>
-              <a:rPr lang="en-US" dirty="0"/>
+              <a:rPr lang="en-US" sz="2000" dirty="0"/>
               <a:t>Raspberry Pi running a Python script to scan for Bluetooth devices and uploading found devices to cloud services.</a:t>
             </a:r>
           </a:p>
@@ -13824,7 +14313,7 @@
 </p:sld>
 </file>
 
-<file path=ppt/slides/slide7.xml><?xml version="1.0" encoding="utf-8"?>
+<file path=ppt/slides/slide8.xml><?xml version="1.0" encoding="utf-8"?>
 <p:sld xmlns:a="http://schemas.openxmlformats.org/drawingml/2006/main" xmlns:r="http://schemas.openxmlformats.org/officeDocument/2006/relationships" xmlns:p="http://schemas.openxmlformats.org/presentationml/2006/main">
   <p:cSld>
     <p:bg>
@@ -13888,11 +14377,13 @@
         </p:nvSpPr>
         <p:spPr/>
         <p:txBody>
-          <a:bodyPr/>
+          <a:bodyPr>
+            <a:normAutofit/>
+          </a:bodyPr>
           <a:lstStyle/>
           <a:p>
             <a:r>
-              <a:rPr lang="en-US" dirty="0"/>
+              <a:rPr lang="en-US" sz="4400" dirty="0"/>
               <a:t>Remaining work</a:t>
             </a:r>
           </a:p>
@@ -13914,10 +14405,15 @@
             <p:ph idx="1"/>
           </p:nvPr>
         </p:nvSpPr>
-        <p:spPr/>
+        <p:spPr>
+          <a:xfrm>
+            <a:off x="1141412" y="1860020"/>
+            <a:ext cx="9905999" cy="3541714"/>
+          </a:xfrm>
+        </p:spPr>
         <p:txBody>
           <a:bodyPr>
-            <a:normAutofit fontScale="85000" lnSpcReduction="20000"/>
+            <a:noAutofit/>
           </a:bodyPr>
           <a:lstStyle/>
           <a:p>
@@ -13989,7 +14485,7 @@
 </p:sld>
 </file>
 
-<file path=ppt/slides/slide8.xml><?xml version="1.0" encoding="utf-8"?>
+<file path=ppt/slides/slide9.xml><?xml version="1.0" encoding="utf-8"?>
 <p:sld xmlns:a="http://schemas.openxmlformats.org/drawingml/2006/main" xmlns:r="http://schemas.openxmlformats.org/officeDocument/2006/relationships" xmlns:p="http://schemas.openxmlformats.org/presentationml/2006/main">
   <p:cSld>
     <p:bg>
@@ -14051,13 +14547,20 @@
             <p:ph type="title"/>
           </p:nvPr>
         </p:nvSpPr>
-        <p:spPr/>
+        <p:spPr>
+          <a:xfrm>
+            <a:off x="532262" y="618518"/>
+            <a:ext cx="11341289" cy="1478570"/>
+          </a:xfrm>
+        </p:spPr>
         <p:txBody>
-          <a:bodyPr/>
+          <a:bodyPr>
+            <a:normAutofit/>
+          </a:bodyPr>
           <a:lstStyle/>
           <a:p>
             <a:r>
-              <a:rPr lang="en-US" dirty="0"/>
+              <a:rPr lang="en-US" sz="4400" dirty="0"/>
               <a:t>Collection of real-life GPS and Ble data</a:t>
             </a:r>
           </a:p>
@@ -14160,7 +14663,7 @@
         </p:blipFill>
         <p:spPr bwMode="auto">
           <a:xfrm>
-            <a:off x="7178724" y="1690688"/>
+            <a:off x="6856991" y="2249487"/>
             <a:ext cx="4366146" cy="3162878"/>
           </a:xfrm>
           <a:prstGeom prst="rect">
@@ -14182,260 +14685,6 @@
     <p:extLst>
       <p:ext uri="{BB962C8B-B14F-4D97-AF65-F5344CB8AC3E}">
         <p14:creationId xmlns:p14="http://schemas.microsoft.com/office/powerpoint/2010/main" val="67735264"/>
-      </p:ext>
-    </p:extLst>
-  </p:cSld>
-  <p:clrMapOvr>
-    <a:masterClrMapping/>
-  </p:clrMapOvr>
-</p:sld>
-</file>
-
-<file path=ppt/slides/slide9.xml><?xml version="1.0" encoding="utf-8"?>
-<p:sld xmlns:a="http://schemas.openxmlformats.org/drawingml/2006/main" xmlns:r="http://schemas.openxmlformats.org/officeDocument/2006/relationships" xmlns:p="http://schemas.openxmlformats.org/presentationml/2006/main">
-  <p:cSld>
-    <p:bg>
-      <p:bgPr>
-        <a:blipFill dpi="0" rotWithShape="1">
-          <a:blip r:embed="rId2">
-            <a:alphaModFix amt="59000"/>
-            <a:duotone>
-              <a:schemeClr val="bg2">
-                <a:shade val="88000"/>
-                <a:hueMod val="106000"/>
-                <a:satMod val="140000"/>
-                <a:lumMod val="54000"/>
-              </a:schemeClr>
-              <a:schemeClr val="bg2">
-                <a:tint val="98000"/>
-                <a:hueMod val="90000"/>
-                <a:satMod val="150000"/>
-                <a:lumMod val="160000"/>
-              </a:schemeClr>
-            </a:duotone>
-            <a:lum/>
-          </a:blip>
-          <a:srcRect/>
-          <a:stretch>
-            <a:fillRect/>
-          </a:stretch>
-        </a:blipFill>
-        <a:effectLst/>
-      </p:bgPr>
-    </p:bg>
-    <p:spTree>
-      <p:nvGrpSpPr>
-        <p:cNvPr id="1" name=""/>
-        <p:cNvGrpSpPr/>
-        <p:nvPr/>
-      </p:nvGrpSpPr>
-      <p:grpSpPr>
-        <a:xfrm>
-          <a:off x="0" y="0"/>
-          <a:ext cx="0" cy="0"/>
-          <a:chOff x="0" y="0"/>
-          <a:chExt cx="0" cy="0"/>
-        </a:xfrm>
-      </p:grpSpPr>
-      <p:sp>
-        <p:nvSpPr>
-          <p:cNvPr id="2" name="Title 1">
-            <a:extLst>
-              <a:ext uri="{FF2B5EF4-FFF2-40B4-BE49-F238E27FC236}">
-                <a16:creationId xmlns:a16="http://schemas.microsoft.com/office/drawing/2014/main" id="{E5B12A03-1FD3-8A43-85CD-9A8CD1A73FB6}"/>
-              </a:ext>
-            </a:extLst>
-          </p:cNvPr>
-          <p:cNvSpPr>
-            <a:spLocks noGrp="1"/>
-          </p:cNvSpPr>
-          <p:nvPr>
-            <p:ph type="title"/>
-          </p:nvPr>
-        </p:nvSpPr>
-        <p:spPr/>
-        <p:txBody>
-          <a:bodyPr/>
-          <a:lstStyle/>
-          <a:p>
-            <a:r>
-              <a:rPr lang="en-US" dirty="0"/>
-              <a:t>Simulation</a:t>
-            </a:r>
-          </a:p>
-        </p:txBody>
-      </p:sp>
-      <p:sp>
-        <p:nvSpPr>
-          <p:cNvPr id="3" name="Content Placeholder 2">
-            <a:extLst>
-              <a:ext uri="{FF2B5EF4-FFF2-40B4-BE49-F238E27FC236}">
-                <a16:creationId xmlns:a16="http://schemas.microsoft.com/office/drawing/2014/main" id="{2D7BEEA7-B316-814C-90D8-E7FCA737EFFE}"/>
-              </a:ext>
-            </a:extLst>
-          </p:cNvPr>
-          <p:cNvSpPr>
-            <a:spLocks noGrp="1"/>
-          </p:cNvSpPr>
-          <p:nvPr>
-            <p:ph idx="1"/>
-          </p:nvPr>
-        </p:nvSpPr>
-        <p:spPr>
-          <a:xfrm>
-            <a:off x="838200" y="1825624"/>
-            <a:ext cx="10515600" cy="4807187"/>
-          </a:xfrm>
-        </p:spPr>
-        <p:txBody>
-          <a:bodyPr>
-            <a:normAutofit lnSpcReduction="10000"/>
-          </a:bodyPr>
-          <a:lstStyle/>
-          <a:p>
-            <a:r>
-              <a:rPr lang="en-US" dirty="0"/>
-              <a:t>Software to allow simulation of assets and their movements. </a:t>
-            </a:r>
-          </a:p>
-          <a:p>
-            <a:r>
-              <a:rPr lang="en-US" dirty="0"/>
-              <a:t>Variables:</a:t>
-            </a:r>
-          </a:p>
-          <a:p>
-            <a:pPr lvl="1"/>
-            <a:r>
-              <a:rPr lang="en-US" dirty="0"/>
-              <a:t>Number of assets and ratio of smart:dumb</a:t>
-            </a:r>
-          </a:p>
-          <a:p>
-            <a:pPr lvl="1"/>
-            <a:r>
-              <a:rPr lang="en-US" dirty="0"/>
-              <a:t>Rate of change of location of assets</a:t>
-            </a:r>
-          </a:p>
-          <a:p>
-            <a:pPr lvl="1"/>
-            <a:r>
-              <a:rPr lang="en-US" dirty="0"/>
-              <a:t>Noisy data</a:t>
-            </a:r>
-          </a:p>
-          <a:p>
-            <a:pPr lvl="1"/>
-            <a:r>
-              <a:rPr lang="en-US" dirty="0"/>
-              <a:t>Accuracy of GPS</a:t>
-            </a:r>
-          </a:p>
-          <a:p>
-            <a:pPr lvl="1"/>
-            <a:r>
-              <a:rPr lang="en-US" dirty="0"/>
-              <a:t>Burstiness of asset uploads</a:t>
-            </a:r>
-          </a:p>
-          <a:p>
-            <a:r>
-              <a:rPr lang="en-US" dirty="0"/>
-              <a:t>Possible software:</a:t>
-            </a:r>
-          </a:p>
-          <a:p>
-            <a:pPr lvl="1"/>
-            <a:r>
-              <a:rPr lang="en-US" dirty="0"/>
-              <a:t>GAMMA (</a:t>
-            </a:r>
-            <a:r>
-              <a:rPr lang="en-US" dirty="0">
-                <a:hlinkClick r:id="rId3"/>
-              </a:rPr>
-              <a:t>https://gama-platform.github.io/</a:t>
-            </a:r>
-            <a:r>
-              <a:rPr lang="en-US" dirty="0"/>
-              <a:t>)</a:t>
-            </a:r>
-          </a:p>
-          <a:p>
-            <a:pPr lvl="1"/>
-            <a:r>
-              <a:rPr lang="en-US" dirty="0"/>
-              <a:t>AnyLogic (</a:t>
-            </a:r>
-            <a:r>
-              <a:rPr lang="en-US" dirty="0">
-                <a:hlinkClick r:id="rId4"/>
-              </a:rPr>
-              <a:t>https://www.anylogic.com/transportation/</a:t>
-            </a:r>
-            <a:r>
-              <a:rPr lang="en-US" dirty="0"/>
-              <a:t>)</a:t>
-            </a:r>
-          </a:p>
-          <a:p>
-            <a:pPr lvl="1"/>
-            <a:r>
-              <a:rPr lang="en-US" dirty="0"/>
-              <a:t>Brinkhoff Generator</a:t>
-            </a:r>
-          </a:p>
-          <a:p>
-            <a:pPr lvl="1"/>
-            <a:endParaRPr lang="en-US" dirty="0"/>
-          </a:p>
-          <a:p>
-            <a:pPr lvl="1"/>
-            <a:endParaRPr lang="en-US" dirty="0"/>
-          </a:p>
-          <a:p>
-            <a:pPr marL="0" indent="0">
-              <a:buNone/>
-            </a:pPr>
-            <a:endParaRPr lang="en-US" dirty="0"/>
-          </a:p>
-        </p:txBody>
-      </p:sp>
-      <p:pic>
-        <p:nvPicPr>
-          <p:cNvPr id="5" name="Picture 4">
-            <a:extLst>
-              <a:ext uri="{FF2B5EF4-FFF2-40B4-BE49-F238E27FC236}">
-                <a16:creationId xmlns:a16="http://schemas.microsoft.com/office/drawing/2014/main" id="{819E8900-03FB-E547-B97D-C2E1864F415A}"/>
-              </a:ext>
-            </a:extLst>
-          </p:cNvPr>
-          <p:cNvPicPr>
-            <a:picLocks noChangeAspect="1"/>
-          </p:cNvPicPr>
-          <p:nvPr/>
-        </p:nvPicPr>
-        <p:blipFill>
-          <a:blip r:embed="rId5"/>
-          <a:stretch>
-            <a:fillRect/>
-          </a:stretch>
-        </p:blipFill>
-        <p:spPr>
-          <a:xfrm>
-            <a:off x="5128050" y="3595037"/>
-            <a:ext cx="6225750" cy="1318156"/>
-          </a:xfrm>
-          <a:prstGeom prst="rect">
-            <a:avLst/>
-          </a:prstGeom>
-        </p:spPr>
-      </p:pic>
-    </p:spTree>
-    <p:extLst>
-      <p:ext uri="{BB962C8B-B14F-4D97-AF65-F5344CB8AC3E}">
-        <p14:creationId xmlns:p14="http://schemas.microsoft.com/office/powerpoint/2010/main" val="4112873"/>
       </p:ext>
     </p:extLst>
   </p:cSld>

</xml_diff>